<commit_message>
Random edits to Midterm ppt
</commit_message>
<xml_diff>
--- a/MidtermPpt.pptx
+++ b/MidtermPpt.pptx
@@ -10,6 +10,7 @@
     <p:sldId id="259" r:id="rId4"/>
     <p:sldId id="260" r:id="rId5"/>
     <p:sldId id="258" r:id="rId6"/>
+    <p:sldId id="261" r:id="rId7"/>
   </p:sldIdLst>
   <p:sldSz cx="12192000" cy="6858000"/>
   <p:notesSz cx="6858000" cy="9144000"/>
@@ -249,7 +250,7 @@
           <a:p>
             <a:fld id="{F458627A-2BAD-4757-AB05-461E9AB5B3D8}" type="datetimeFigureOut">
               <a:rPr lang="en-US" smtClean="0"/>
-              <a:t>11/8/2015</a:t>
+              <a:t>11/13/2015</a:t>
             </a:fld>
             <a:endParaRPr lang="en-US"/>
           </a:p>
@@ -536,7 +537,7 @@
           <a:p>
             <a:fld id="{F458627A-2BAD-4757-AB05-461E9AB5B3D8}" type="datetimeFigureOut">
               <a:rPr lang="en-US" smtClean="0"/>
-              <a:t>11/8/2015</a:t>
+              <a:t>11/13/2015</a:t>
             </a:fld>
             <a:endParaRPr lang="en-US"/>
           </a:p>
@@ -728,7 +729,7 @@
           <a:p>
             <a:fld id="{F458627A-2BAD-4757-AB05-461E9AB5B3D8}" type="datetimeFigureOut">
               <a:rPr lang="en-US" smtClean="0"/>
-              <a:t>11/8/2015</a:t>
+              <a:t>11/13/2015</a:t>
             </a:fld>
             <a:endParaRPr lang="en-US"/>
           </a:p>
@@ -989,7 +990,7 @@
           <a:p>
             <a:fld id="{F458627A-2BAD-4757-AB05-461E9AB5B3D8}" type="datetimeFigureOut">
               <a:rPr lang="en-US" smtClean="0"/>
-              <a:t>11/8/2015</a:t>
+              <a:t>11/13/2015</a:t>
             </a:fld>
             <a:endParaRPr lang="en-US"/>
           </a:p>
@@ -1413,7 +1414,7 @@
           <a:p>
             <a:fld id="{F458627A-2BAD-4757-AB05-461E9AB5B3D8}" type="datetimeFigureOut">
               <a:rPr lang="en-US" smtClean="0"/>
-              <a:t>11/8/2015</a:t>
+              <a:t>11/13/2015</a:t>
             </a:fld>
             <a:endParaRPr lang="en-US"/>
           </a:p>
@@ -1959,7 +1960,7 @@
           <a:p>
             <a:fld id="{F458627A-2BAD-4757-AB05-461E9AB5B3D8}" type="datetimeFigureOut">
               <a:rPr lang="en-US" smtClean="0"/>
-              <a:t>11/8/2015</a:t>
+              <a:t>11/13/2015</a:t>
             </a:fld>
             <a:endParaRPr lang="en-US"/>
           </a:p>
@@ -2799,7 +2800,7 @@
           <a:p>
             <a:fld id="{F458627A-2BAD-4757-AB05-461E9AB5B3D8}" type="datetimeFigureOut">
               <a:rPr lang="en-US" smtClean="0"/>
-              <a:t>11/8/2015</a:t>
+              <a:t>11/13/2015</a:t>
             </a:fld>
             <a:endParaRPr lang="en-US"/>
           </a:p>
@@ -2969,7 +2970,7 @@
           <a:p>
             <a:fld id="{F458627A-2BAD-4757-AB05-461E9AB5B3D8}" type="datetimeFigureOut">
               <a:rPr lang="en-US" smtClean="0"/>
-              <a:t>11/8/2015</a:t>
+              <a:t>11/13/2015</a:t>
             </a:fld>
             <a:endParaRPr lang="en-US"/>
           </a:p>
@@ -3153,7 +3154,7 @@
           <a:p>
             <a:fld id="{F458627A-2BAD-4757-AB05-461E9AB5B3D8}" type="datetimeFigureOut">
               <a:rPr lang="en-US" smtClean="0"/>
-              <a:t>11/8/2015</a:t>
+              <a:t>11/13/2015</a:t>
             </a:fld>
             <a:endParaRPr lang="en-US"/>
           </a:p>
@@ -3323,7 +3324,7 @@
           <a:p>
             <a:fld id="{F458627A-2BAD-4757-AB05-461E9AB5B3D8}" type="datetimeFigureOut">
               <a:rPr lang="en-US" smtClean="0"/>
-              <a:t>11/8/2015</a:t>
+              <a:t>11/13/2015</a:t>
             </a:fld>
             <a:endParaRPr lang="en-US"/>
           </a:p>
@@ -3571,7 +3572,7 @@
           <a:p>
             <a:fld id="{F458627A-2BAD-4757-AB05-461E9AB5B3D8}" type="datetimeFigureOut">
               <a:rPr lang="en-US" smtClean="0"/>
-              <a:t>11/8/2015</a:t>
+              <a:t>11/13/2015</a:t>
             </a:fld>
             <a:endParaRPr lang="en-US"/>
           </a:p>
@@ -3808,7 +3809,7 @@
           <a:p>
             <a:fld id="{F458627A-2BAD-4757-AB05-461E9AB5B3D8}" type="datetimeFigureOut">
               <a:rPr lang="en-US" smtClean="0"/>
-              <a:t>11/8/2015</a:t>
+              <a:t>11/13/2015</a:t>
             </a:fld>
             <a:endParaRPr lang="en-US"/>
           </a:p>
@@ -4181,7 +4182,7 @@
           <a:p>
             <a:fld id="{F458627A-2BAD-4757-AB05-461E9AB5B3D8}" type="datetimeFigureOut">
               <a:rPr lang="en-US" smtClean="0"/>
-              <a:t>11/8/2015</a:t>
+              <a:t>11/13/2015</a:t>
             </a:fld>
             <a:endParaRPr lang="en-US"/>
           </a:p>
@@ -4299,7 +4300,7 @@
           <a:p>
             <a:fld id="{F458627A-2BAD-4757-AB05-461E9AB5B3D8}" type="datetimeFigureOut">
               <a:rPr lang="en-US" smtClean="0"/>
-              <a:t>11/8/2015</a:t>
+              <a:t>11/13/2015</a:t>
             </a:fld>
             <a:endParaRPr lang="en-US"/>
           </a:p>
@@ -4394,7 +4395,7 @@
           <a:p>
             <a:fld id="{F458627A-2BAD-4757-AB05-461E9AB5B3D8}" type="datetimeFigureOut">
               <a:rPr lang="en-US" smtClean="0"/>
-              <a:t>11/8/2015</a:t>
+              <a:t>11/13/2015</a:t>
             </a:fld>
             <a:endParaRPr lang="en-US"/>
           </a:p>
@@ -4645,7 +4646,7 @@
           <a:p>
             <a:fld id="{F458627A-2BAD-4757-AB05-461E9AB5B3D8}" type="datetimeFigureOut">
               <a:rPr lang="en-US" smtClean="0"/>
-              <a:t>11/8/2015</a:t>
+              <a:t>11/13/2015</a:t>
             </a:fld>
             <a:endParaRPr lang="en-US"/>
           </a:p>
@@ -4932,7 +4933,7 @@
           <a:p>
             <a:fld id="{F458627A-2BAD-4757-AB05-461E9AB5B3D8}" type="datetimeFigureOut">
               <a:rPr lang="en-US" smtClean="0"/>
-              <a:t>11/8/2015</a:t>
+              <a:t>11/13/2015</a:t>
             </a:fld>
             <a:endParaRPr lang="en-US"/>
           </a:p>
@@ -5145,7 +5146,7 @@
           <a:p>
             <a:fld id="{F458627A-2BAD-4757-AB05-461E9AB5B3D8}" type="datetimeFigureOut">
               <a:rPr lang="en-US" smtClean="0"/>
-              <a:t>11/8/2015</a:t>
+              <a:t>11/13/2015</a:t>
             </a:fld>
             <a:endParaRPr lang="en-US"/>
           </a:p>
@@ -6062,7 +6063,11 @@
           <a:bodyPr/>
           <a:lstStyle/>
           <a:p>
-            <a:endParaRPr lang="en-US"/>
+            <a:r>
+              <a:rPr lang="en-US" dirty="0" smtClean="0"/>
+              <a:t>With Facebook and LinkedIn using PHP</a:t>
+            </a:r>
+            <a:endParaRPr lang="en-US" dirty="0"/>
           </a:p>
         </p:txBody>
       </p:sp>
@@ -6104,7 +6109,11 @@
           <a:bodyPr/>
           <a:lstStyle/>
           <a:p>
-            <a:endParaRPr lang="en-US"/>
+            <a:r>
+              <a:rPr lang="en-US" dirty="0" smtClean="0"/>
+              <a:t>Filtering only public information to simulate behavior of a malicious user</a:t>
+            </a:r>
+            <a:endParaRPr lang="en-US" dirty="0"/>
           </a:p>
         </p:txBody>
       </p:sp>
@@ -6148,35 +6157,21 @@
             <p:ph type="title"/>
           </p:nvPr>
         </p:nvSpPr>
-        <p:spPr/>
-        <p:txBody>
-          <a:bodyPr/>
-          <a:lstStyle/>
-          <a:p>
-            <a:r>
-              <a:rPr lang="en-US" smtClean="0"/>
-              <a:t>WEIGHT FUNCTION</a:t>
-            </a:r>
-            <a:endParaRPr lang="en-US"/>
-          </a:p>
-        </p:txBody>
-      </p:sp>
-      <p:sp>
-        <p:nvSpPr>
-          <p:cNvPr id="8" name="Content Placeholder 7"/>
-          <p:cNvSpPr>
-            <a:spLocks noGrp="1"/>
-          </p:cNvSpPr>
-          <p:nvPr>
-            <p:ph idx="1"/>
-          </p:nvPr>
-        </p:nvSpPr>
-        <p:spPr/>
-        <p:txBody>
-          <a:bodyPr/>
-          <a:lstStyle/>
-          <a:p>
-            <a:endParaRPr lang="en-US"/>
+        <p:spPr>
+          <a:xfrm>
+            <a:off x="917228" y="609600"/>
+            <a:ext cx="10403302" cy="794197"/>
+          </a:xfrm>
+        </p:spPr>
+        <p:txBody>
+          <a:bodyPr/>
+          <a:lstStyle/>
+          <a:p>
+            <a:r>
+              <a:rPr lang="en-US" dirty="0" smtClean="0"/>
+              <a:t>WEIGHTs for profile attributes</a:t>
+            </a:r>
+            <a:endParaRPr lang="en-US" dirty="0"/>
           </a:p>
         </p:txBody>
       </p:sp>
@@ -6190,12 +6185,86 @@
             <p:ph type="body" sz="half" idx="2"/>
           </p:nvPr>
         </p:nvSpPr>
-        <p:spPr/>
-        <p:txBody>
-          <a:bodyPr/>
-          <a:lstStyle/>
-          <a:p>
-            <a:endParaRPr lang="en-US"/>
+        <p:spPr>
+          <a:xfrm>
+            <a:off x="917228" y="1609860"/>
+            <a:ext cx="10403302" cy="4181340"/>
+          </a:xfrm>
+        </p:spPr>
+        <p:txBody>
+          <a:bodyPr>
+            <a:normAutofit/>
+          </a:bodyPr>
+          <a:lstStyle/>
+          <a:p>
+            <a:pPr marL="285750" indent="-285750" algn="l">
+              <a:buFont typeface="Arial" panose="020B0604020202020204" pitchFamily="34" charset="0"/>
+              <a:buChar char="•"/>
+            </a:pPr>
+            <a:r>
+              <a:rPr lang="en-US" sz="2400" dirty="0" smtClean="0"/>
+              <a:t>Weights based on risk associated with attributes</a:t>
+            </a:r>
+          </a:p>
+          <a:p>
+            <a:pPr marL="285750" indent="-285750" algn="l">
+              <a:buFont typeface="Arial" panose="020B0604020202020204" pitchFamily="34" charset="0"/>
+              <a:buChar char="•"/>
+            </a:pPr>
+            <a:r>
+              <a:rPr lang="en-US" sz="2400" dirty="0" smtClean="0"/>
+              <a:t>The riskier an attribute the more weight </a:t>
+            </a:r>
+            <a:r>
+              <a:rPr lang="en-US" sz="2400" smtClean="0"/>
+              <a:t>it will have</a:t>
+            </a:r>
+            <a:endParaRPr lang="en-US" sz="2400" dirty="0" smtClean="0"/>
+          </a:p>
+          <a:p>
+            <a:pPr marL="285750" indent="-285750" algn="l">
+              <a:buFont typeface="Arial" panose="020B0604020202020204" pitchFamily="34" charset="0"/>
+              <a:buChar char="•"/>
+            </a:pPr>
+            <a:r>
+              <a:rPr lang="en-US" sz="2400" dirty="0" smtClean="0"/>
+              <a:t>These could be risks of – </a:t>
+            </a:r>
+          </a:p>
+          <a:p>
+            <a:pPr marL="742950" lvl="1" indent="-285750">
+              <a:buFont typeface="Arial" panose="020B0604020202020204" pitchFamily="34" charset="0"/>
+              <a:buChar char="•"/>
+            </a:pPr>
+            <a:r>
+              <a:rPr lang="en-US" sz="2400" dirty="0" smtClean="0"/>
+              <a:t>Password recovery</a:t>
+            </a:r>
+          </a:p>
+          <a:p>
+            <a:pPr marL="742950" lvl="1" indent="-285750">
+              <a:buFont typeface="Arial" panose="020B0604020202020204" pitchFamily="34" charset="0"/>
+              <a:buChar char="•"/>
+            </a:pPr>
+            <a:r>
+              <a:rPr lang="en-US" sz="2400" dirty="0" smtClean="0"/>
+              <a:t>Identity theft</a:t>
+            </a:r>
+          </a:p>
+          <a:p>
+            <a:pPr marL="742950" lvl="1" indent="-285750">
+              <a:buFont typeface="Arial" panose="020B0604020202020204" pitchFamily="34" charset="0"/>
+              <a:buChar char="•"/>
+            </a:pPr>
+            <a:r>
+              <a:rPr lang="en-US" sz="2400" dirty="0" smtClean="0"/>
+              <a:t>Cross Site Linking</a:t>
+            </a:r>
+            <a:endParaRPr lang="en-US" sz="2800" dirty="0"/>
+          </a:p>
+          <a:p>
+            <a:pPr lvl="1"/>
+            <a:endParaRPr lang="en-US" sz="2600" dirty="0"/>
           </a:p>
         </p:txBody>
       </p:sp>
@@ -6278,7 +6347,7 @@
         </p:spPr>
         <p:txBody>
           <a:bodyPr>
-            <a:normAutofit fontScale="85000" lnSpcReduction="10000"/>
+            <a:normAutofit fontScale="92500" lnSpcReduction="20000"/>
           </a:bodyPr>
           <a:lstStyle/>
           <a:p>
@@ -6325,7 +6394,11 @@
             </a:pPr>
             <a:r>
               <a:rPr lang="en-US" sz="2800" dirty="0" smtClean="0"/>
-              <a:t>Have weights associated with all attributes based on crime records - </a:t>
+              <a:t>Have weights associated with all attributes </a:t>
+            </a:r>
+            <a:r>
+              <a:rPr lang="en-US" sz="2800" dirty="0" smtClean="0"/>
+              <a:t>- </a:t>
             </a:r>
             <a:r>
               <a:rPr lang="en-US" sz="2800" dirty="0" smtClean="0">
@@ -6362,7 +6435,11 @@
             </a:pPr>
             <a:r>
               <a:rPr lang="en-US" sz="2800" dirty="0" smtClean="0"/>
-              <a:t>Identify attributes that could be left out to reduce weight - </a:t>
+              <a:t>Identify attributes that could be left out to reduce weight </a:t>
+            </a:r>
+            <a:r>
+              <a:rPr lang="en-US" sz="2800" dirty="0" smtClean="0"/>
+              <a:t>with less effect on visibility- </a:t>
             </a:r>
             <a:r>
               <a:rPr lang="en-US" sz="2800" dirty="0" smtClean="0">
@@ -6380,6 +6457,59 @@
     <p:extLst>
       <p:ext uri="{BB962C8B-B14F-4D97-AF65-F5344CB8AC3E}">
         <p14:creationId xmlns:p14="http://schemas.microsoft.com/office/powerpoint/2010/main" val="2905506868"/>
+      </p:ext>
+    </p:extLst>
+  </p:cSld>
+  <p:clrMapOvr>
+    <a:masterClrMapping/>
+  </p:clrMapOvr>
+</p:sld>
+</file>
+
+<file path=ppt/slides/slide6.xml><?xml version="1.0" encoding="utf-8"?>
+<p:sld xmlns:a="http://schemas.openxmlformats.org/drawingml/2006/main" xmlns:r="http://schemas.openxmlformats.org/officeDocument/2006/relationships" xmlns:p="http://schemas.openxmlformats.org/presentationml/2006/main">
+  <p:cSld>
+    <p:spTree>
+      <p:nvGrpSpPr>
+        <p:cNvPr id="1" name=""/>
+        <p:cNvGrpSpPr/>
+        <p:nvPr/>
+      </p:nvGrpSpPr>
+      <p:grpSpPr>
+        <a:xfrm>
+          <a:off x="0" y="0"/>
+          <a:ext cx="0" cy="0"/>
+          <a:chOff x="0" y="0"/>
+          <a:chExt cx="0" cy="0"/>
+        </a:xfrm>
+      </p:grpSpPr>
+      <p:sp>
+        <p:nvSpPr>
+          <p:cNvPr id="5" name="Title 4"/>
+          <p:cNvSpPr>
+            <a:spLocks noGrp="1"/>
+          </p:cNvSpPr>
+          <p:nvPr>
+            <p:ph type="title"/>
+          </p:nvPr>
+        </p:nvSpPr>
+        <p:spPr/>
+        <p:txBody>
+          <a:bodyPr/>
+          <a:lstStyle/>
+          <a:p>
+            <a:r>
+              <a:rPr lang="en-US" dirty="0" smtClean="0"/>
+              <a:t>QUESTIONS AND SUGGESTIONS</a:t>
+            </a:r>
+            <a:endParaRPr lang="en-US" dirty="0"/>
+          </a:p>
+        </p:txBody>
+      </p:sp>
+    </p:spTree>
+    <p:extLst>
+      <p:ext uri="{BB962C8B-B14F-4D97-AF65-F5344CB8AC3E}">
+        <p14:creationId xmlns:p14="http://schemas.microsoft.com/office/powerpoint/2010/main" val="4198866025"/>
       </p:ext>
     </p:extLst>
   </p:cSld>

</xml_diff>